<commit_message>
added movement per iteration calculations
</commit_message>
<xml_diff>
--- a/nano_mill/description.pptx
+++ b/nano_mill/description.pptx
@@ -7,6 +7,7 @@
   <p:sldIdLst>
     <p:sldId id="256" r:id="rId2"/>
     <p:sldId id="257" r:id="rId3"/>
+    <p:sldId id="258" r:id="rId4"/>
   </p:sldIdLst>
   <p:sldSz cx="9144000" cy="6858000" type="screen4x3"/>
   <p:notesSz cx="6858000" cy="9144000"/>
@@ -289,7 +290,7 @@
           <a:p>
             <a:fld id="{ADA040D9-D6B8-435D-A8A0-5862BA4C7EDE}" type="datetimeFigureOut">
               <a:rPr lang="sv-SE" smtClean="0"/>
-              <a:t>2018-12-21</a:t>
+              <a:t>2019-01-03</a:t>
             </a:fld>
             <a:endParaRPr lang="sv-SE"/>
           </a:p>
@@ -459,7 +460,7 @@
           <a:p>
             <a:fld id="{ADA040D9-D6B8-435D-A8A0-5862BA4C7EDE}" type="datetimeFigureOut">
               <a:rPr lang="sv-SE" smtClean="0"/>
-              <a:t>2018-12-21</a:t>
+              <a:t>2019-01-03</a:t>
             </a:fld>
             <a:endParaRPr lang="sv-SE"/>
           </a:p>
@@ -639,7 +640,7 @@
           <a:p>
             <a:fld id="{ADA040D9-D6B8-435D-A8A0-5862BA4C7EDE}" type="datetimeFigureOut">
               <a:rPr lang="sv-SE" smtClean="0"/>
-              <a:t>2018-12-21</a:t>
+              <a:t>2019-01-03</a:t>
             </a:fld>
             <a:endParaRPr lang="sv-SE"/>
           </a:p>
@@ -809,7 +810,7 @@
           <a:p>
             <a:fld id="{ADA040D9-D6B8-435D-A8A0-5862BA4C7EDE}" type="datetimeFigureOut">
               <a:rPr lang="sv-SE" smtClean="0"/>
-              <a:t>2018-12-21</a:t>
+              <a:t>2019-01-03</a:t>
             </a:fld>
             <a:endParaRPr lang="sv-SE"/>
           </a:p>
@@ -1055,7 +1056,7 @@
           <a:p>
             <a:fld id="{ADA040D9-D6B8-435D-A8A0-5862BA4C7EDE}" type="datetimeFigureOut">
               <a:rPr lang="sv-SE" smtClean="0"/>
-              <a:t>2018-12-21</a:t>
+              <a:t>2019-01-03</a:t>
             </a:fld>
             <a:endParaRPr lang="sv-SE"/>
           </a:p>
@@ -1343,7 +1344,7 @@
           <a:p>
             <a:fld id="{ADA040D9-D6B8-435D-A8A0-5862BA4C7EDE}" type="datetimeFigureOut">
               <a:rPr lang="sv-SE" smtClean="0"/>
-              <a:t>2018-12-21</a:t>
+              <a:t>2019-01-03</a:t>
             </a:fld>
             <a:endParaRPr lang="sv-SE"/>
           </a:p>
@@ -1765,7 +1766,7 @@
           <a:p>
             <a:fld id="{ADA040D9-D6B8-435D-A8A0-5862BA4C7EDE}" type="datetimeFigureOut">
               <a:rPr lang="sv-SE" smtClean="0"/>
-              <a:t>2018-12-21</a:t>
+              <a:t>2019-01-03</a:t>
             </a:fld>
             <a:endParaRPr lang="sv-SE"/>
           </a:p>
@@ -1883,7 +1884,7 @@
           <a:p>
             <a:fld id="{ADA040D9-D6B8-435D-A8A0-5862BA4C7EDE}" type="datetimeFigureOut">
               <a:rPr lang="sv-SE" smtClean="0"/>
-              <a:t>2018-12-21</a:t>
+              <a:t>2019-01-03</a:t>
             </a:fld>
             <a:endParaRPr lang="sv-SE"/>
           </a:p>
@@ -1978,7 +1979,7 @@
           <a:p>
             <a:fld id="{ADA040D9-D6B8-435D-A8A0-5862BA4C7EDE}" type="datetimeFigureOut">
               <a:rPr lang="sv-SE" smtClean="0"/>
-              <a:t>2018-12-21</a:t>
+              <a:t>2019-01-03</a:t>
             </a:fld>
             <a:endParaRPr lang="sv-SE"/>
           </a:p>
@@ -2255,7 +2256,7 @@
           <a:p>
             <a:fld id="{ADA040D9-D6B8-435D-A8A0-5862BA4C7EDE}" type="datetimeFigureOut">
               <a:rPr lang="sv-SE" smtClean="0"/>
-              <a:t>2018-12-21</a:t>
+              <a:t>2019-01-03</a:t>
             </a:fld>
             <a:endParaRPr lang="sv-SE"/>
           </a:p>
@@ -2508,7 +2509,7 @@
           <a:p>
             <a:fld id="{ADA040D9-D6B8-435D-A8A0-5862BA4C7EDE}" type="datetimeFigureOut">
               <a:rPr lang="sv-SE" smtClean="0"/>
-              <a:t>2018-12-21</a:t>
+              <a:t>2019-01-03</a:t>
             </a:fld>
             <a:endParaRPr lang="sv-SE"/>
           </a:p>
@@ -2721,7 +2722,7 @@
           <a:p>
             <a:fld id="{ADA040D9-D6B8-435D-A8A0-5862BA4C7EDE}" type="datetimeFigureOut">
               <a:rPr lang="sv-SE" smtClean="0"/>
-              <a:t>2018-12-21</a:t>
+              <a:t>2019-01-03</a:t>
             </a:fld>
             <a:endParaRPr lang="sv-SE"/>
           </a:p>
@@ -3099,9 +3100,7 @@
       <p:cxnSp>
         <p:nvCxnSpPr>
           <p:cNvPr id="5" name="Straight Connector 4"/>
-          <p:cNvCxnSpPr>
-            <a:endCxn id="6" idx="3"/>
-          </p:cNvCxnSpPr>
+          <p:cNvCxnSpPr/>
           <p:nvPr/>
         </p:nvCxnSpPr>
         <p:spPr>
@@ -3494,7 +3493,7 @@
         </p:nvSpPr>
         <p:spPr>
           <a:xfrm>
-            <a:off x="971600" y="3645024"/>
+            <a:off x="830487" y="3645024"/>
             <a:ext cx="2389565" cy="369332"/>
           </a:xfrm>
           <a:prstGeom prst="rect">
@@ -3525,14 +3524,14 @@
           <p:nvPr>
             <p:extLst>
               <p:ext uri="{D42A27DB-BD31-4B8C-83A1-F6EECF244321}">
-                <p14:modId xmlns:p14="http://schemas.microsoft.com/office/powerpoint/2010/main" val="787008407"/>
+                <p14:modId xmlns:p14="http://schemas.microsoft.com/office/powerpoint/2010/main" val="1173706368"/>
               </p:ext>
             </p:extLst>
           </p:nvPr>
         </p:nvGraphicFramePr>
         <p:xfrm>
-          <a:off x="1005020" y="4005064"/>
-          <a:ext cx="2486860" cy="1368152"/>
+          <a:off x="611561" y="4005064"/>
+          <a:ext cx="3168351" cy="1368152"/>
         </p:xfrm>
         <a:graphic>
           <a:graphicData uri="http://schemas.openxmlformats.org/drawingml/2006/table">
@@ -3541,8 +3540,9 @@
                 <a:tableStyleId>{073A0DAA-6AF3-43AB-8588-CEC1D06C72B9}</a:tableStyleId>
               </a:tblPr>
               <a:tblGrid>
-                <a:gridCol w="1243430"/>
-                <a:gridCol w="1243430"/>
+                <a:gridCol w="1056117"/>
+                <a:gridCol w="1056117"/>
+                <a:gridCol w="1056117"/>
               </a:tblGrid>
               <a:tr h="462728">
                 <a:tc>
@@ -3581,6 +3581,20 @@
                   </a:txBody>
                   <a:tcPr/>
                 </a:tc>
+                <a:tc>
+                  <a:txBody>
+                    <a:bodyPr/>
+                    <a:lstStyle/>
+                    <a:p>
+                      <a:r>
+                        <a:rPr lang="sv-SE" sz="1200" dirty="0" smtClean="0"/>
+                        <a:t>10um/100ms</a:t>
+                      </a:r>
+                      <a:endParaRPr lang="sv-SE" sz="1200" dirty="0"/>
+                    </a:p>
+                  </a:txBody>
+                  <a:tcPr/>
+                </a:tc>
               </a:tr>
               <a:tr h="301808">
                 <a:tc>
@@ -3605,6 +3619,20 @@
                       <a:r>
                         <a:rPr lang="sv-SE" sz="1200" dirty="0" smtClean="0"/>
                         <a:t>0.667</a:t>
+                      </a:r>
+                      <a:endParaRPr lang="sv-SE" sz="1200" dirty="0"/>
+                    </a:p>
+                  </a:txBody>
+                  <a:tcPr/>
+                </a:tc>
+                <a:tc>
+                  <a:txBody>
+                    <a:bodyPr/>
+                    <a:lstStyle/>
+                    <a:p>
+                      <a:r>
+                        <a:rPr lang="sv-SE" sz="1200" dirty="0" smtClean="0"/>
+                        <a:t>66.7</a:t>
                       </a:r>
                       <a:endParaRPr lang="sv-SE" sz="1200" dirty="0"/>
                     </a:p>
@@ -3641,6 +3669,20 @@
                   </a:txBody>
                   <a:tcPr/>
                 </a:tc>
+                <a:tc>
+                  <a:txBody>
+                    <a:bodyPr/>
+                    <a:lstStyle/>
+                    <a:p>
+                      <a:r>
+                        <a:rPr lang="sv-SE" sz="1200" dirty="0" smtClean="0"/>
+                        <a:t>33.3</a:t>
+                      </a:r>
+                      <a:endParaRPr lang="sv-SE" sz="1200" dirty="0"/>
+                    </a:p>
+                  </a:txBody>
+                  <a:tcPr/>
+                </a:tc>
               </a:tr>
               <a:tr h="301808">
                 <a:tc>
@@ -3665,6 +3707,20 @@
                       <a:r>
                         <a:rPr lang="sv-SE" sz="1200" dirty="0" smtClean="0"/>
                         <a:t>0.1667</a:t>
+                      </a:r>
+                      <a:endParaRPr lang="sv-SE" sz="1200" dirty="0"/>
+                    </a:p>
+                  </a:txBody>
+                  <a:tcPr/>
+                </a:tc>
+                <a:tc>
+                  <a:txBody>
+                    <a:bodyPr/>
+                    <a:lstStyle/>
+                    <a:p>
+                      <a:r>
+                        <a:rPr lang="sv-SE" sz="1200" dirty="0" smtClean="0"/>
+                        <a:t>16.7</a:t>
                       </a:r>
                       <a:endParaRPr lang="sv-SE" sz="1200" dirty="0"/>
                     </a:p>
@@ -4300,6 +4356,224 @@
           </a:p>
         </p:txBody>
       </p:sp>
+      <p:sp>
+        <p:nvSpPr>
+          <p:cNvPr id="23" name="Left Brace 22"/>
+          <p:cNvSpPr/>
+          <p:nvPr/>
+        </p:nvSpPr>
+        <p:spPr>
+          <a:xfrm rot="16200000">
+            <a:off x="2359472" y="1936549"/>
+            <a:ext cx="248596" cy="288033"/>
+          </a:xfrm>
+          <a:prstGeom prst="leftBrace">
+            <a:avLst/>
+          </a:prstGeom>
+        </p:spPr>
+        <p:style>
+          <a:lnRef idx="1">
+            <a:schemeClr val="dk1"/>
+          </a:lnRef>
+          <a:fillRef idx="0">
+            <a:schemeClr val="dk1"/>
+          </a:fillRef>
+          <a:effectRef idx="0">
+            <a:schemeClr val="dk1"/>
+          </a:effectRef>
+          <a:fontRef idx="minor">
+            <a:schemeClr val="tx1"/>
+          </a:fontRef>
+        </p:style>
+        <p:txBody>
+          <a:bodyPr rtlCol="0" anchor="ctr"/>
+          <a:lstStyle/>
+          <a:p>
+            <a:pPr algn="ctr"/>
+            <a:endParaRPr lang="sv-SE"/>
+          </a:p>
+        </p:txBody>
+      </p:sp>
+      <p:cxnSp>
+        <p:nvCxnSpPr>
+          <p:cNvPr id="20" name="Straight Connector 19"/>
+          <p:cNvCxnSpPr>
+            <a:stCxn id="19" idx="4"/>
+            <a:endCxn id="23" idx="2"/>
+          </p:cNvCxnSpPr>
+          <p:nvPr/>
+        </p:nvCxnSpPr>
+        <p:spPr>
+          <a:xfrm>
+            <a:off x="2627784" y="1628800"/>
+            <a:ext cx="3" cy="327468"/>
+          </a:xfrm>
+          <a:prstGeom prst="line">
+            <a:avLst/>
+          </a:prstGeom>
+          <a:ln>
+            <a:prstDash val="sysDash"/>
+          </a:ln>
+        </p:spPr>
+        <p:style>
+          <a:lnRef idx="1">
+            <a:schemeClr val="accent1"/>
+          </a:lnRef>
+          <a:fillRef idx="0">
+            <a:schemeClr val="accent1"/>
+          </a:fillRef>
+          <a:effectRef idx="0">
+            <a:schemeClr val="accent1"/>
+          </a:effectRef>
+          <a:fontRef idx="minor">
+            <a:schemeClr val="tx1"/>
+          </a:fontRef>
+        </p:style>
+      </p:cxnSp>
+      <p:sp>
+        <p:nvSpPr>
+          <p:cNvPr id="24" name="Left Brace 23"/>
+          <p:cNvSpPr/>
+          <p:nvPr/>
+        </p:nvSpPr>
+        <p:spPr>
+          <a:xfrm rot="10800000">
+            <a:off x="2707765" y="1556791"/>
+            <a:ext cx="248596" cy="324036"/>
+          </a:xfrm>
+          <a:prstGeom prst="leftBrace">
+            <a:avLst/>
+          </a:prstGeom>
+        </p:spPr>
+        <p:style>
+          <a:lnRef idx="1">
+            <a:schemeClr val="dk1"/>
+          </a:lnRef>
+          <a:fillRef idx="0">
+            <a:schemeClr val="dk1"/>
+          </a:fillRef>
+          <a:effectRef idx="0">
+            <a:schemeClr val="dk1"/>
+          </a:effectRef>
+          <a:fontRef idx="minor">
+            <a:schemeClr val="tx1"/>
+          </a:fontRef>
+        </p:style>
+        <p:txBody>
+          <a:bodyPr rtlCol="0" anchor="ctr"/>
+          <a:lstStyle/>
+          <a:p>
+            <a:pPr algn="ctr"/>
+            <a:endParaRPr lang="sv-SE"/>
+          </a:p>
+        </p:txBody>
+      </p:sp>
+      <p:cxnSp>
+        <p:nvCxnSpPr>
+          <p:cNvPr id="25" name="Straight Connector 24"/>
+          <p:cNvCxnSpPr>
+            <a:stCxn id="24" idx="0"/>
+            <a:endCxn id="18" idx="6"/>
+          </p:cNvCxnSpPr>
+          <p:nvPr/>
+        </p:nvCxnSpPr>
+        <p:spPr>
+          <a:xfrm flipH="1">
+            <a:off x="2411760" y="1880827"/>
+            <a:ext cx="296005" cy="1"/>
+          </a:xfrm>
+          <a:prstGeom prst="line">
+            <a:avLst/>
+          </a:prstGeom>
+          <a:ln>
+            <a:prstDash val="sysDash"/>
+          </a:ln>
+        </p:spPr>
+        <p:style>
+          <a:lnRef idx="1">
+            <a:schemeClr val="accent1"/>
+          </a:lnRef>
+          <a:fillRef idx="0">
+            <a:schemeClr val="accent1"/>
+          </a:fillRef>
+          <a:effectRef idx="0">
+            <a:schemeClr val="accent1"/>
+          </a:effectRef>
+          <a:fontRef idx="minor">
+            <a:schemeClr val="tx1"/>
+          </a:fontRef>
+        </p:style>
+      </p:cxnSp>
+      <p:sp>
+        <p:nvSpPr>
+          <p:cNvPr id="31" name="Rectangle 30"/>
+          <p:cNvSpPr/>
+          <p:nvPr/>
+        </p:nvSpPr>
+        <p:spPr>
+          <a:xfrm>
+            <a:off x="2253015" y="2132856"/>
+            <a:ext cx="466794" cy="369332"/>
+          </a:xfrm>
+          <a:prstGeom prst="rect">
+            <a:avLst/>
+          </a:prstGeom>
+        </p:spPr>
+        <p:txBody>
+          <a:bodyPr wrap="none">
+            <a:spAutoFit/>
+          </a:bodyPr>
+          <a:lstStyle/>
+          <a:p>
+            <a:r>
+              <a:rPr lang="el-GR" dirty="0"/>
+              <a:t>Δ</a:t>
+            </a:r>
+            <a:r>
+              <a:rPr lang="sv-SE" dirty="0"/>
+              <a:t>x</a:t>
+            </a:r>
+            <a:r>
+              <a:rPr lang="el-GR" dirty="0"/>
+              <a:t> </a:t>
+            </a:r>
+            <a:endParaRPr lang="sv-SE" dirty="0"/>
+          </a:p>
+        </p:txBody>
+      </p:sp>
+      <p:sp>
+        <p:nvSpPr>
+          <p:cNvPr id="32" name="Rectangle 31"/>
+          <p:cNvSpPr/>
+          <p:nvPr/>
+        </p:nvSpPr>
+        <p:spPr>
+          <a:xfrm>
+            <a:off x="2881070" y="1547500"/>
+            <a:ext cx="418704" cy="369332"/>
+          </a:xfrm>
+          <a:prstGeom prst="rect">
+            <a:avLst/>
+          </a:prstGeom>
+        </p:spPr>
+        <p:txBody>
+          <a:bodyPr wrap="none">
+            <a:spAutoFit/>
+          </a:bodyPr>
+          <a:lstStyle/>
+          <a:p>
+            <a:r>
+              <a:rPr lang="el-GR" dirty="0" smtClean="0"/>
+              <a:t>Δ</a:t>
+            </a:r>
+            <a:r>
+              <a:rPr lang="sv-SE" dirty="0" smtClean="0"/>
+              <a:t>y</a:t>
+            </a:r>
+            <a:endParaRPr lang="sv-SE" dirty="0"/>
+          </a:p>
+        </p:txBody>
+      </p:sp>
     </p:spTree>
     <p:extLst>
       <p:ext uri="{BB962C8B-B14F-4D97-AF65-F5344CB8AC3E}">
@@ -5012,6 +5286,1212 @@
     <p:extLst>
       <p:ext uri="{BB962C8B-B14F-4D97-AF65-F5344CB8AC3E}">
         <p14:creationId xmlns:p14="http://schemas.microsoft.com/office/powerpoint/2010/main" val="1350847561"/>
+      </p:ext>
+    </p:extLst>
+  </p:cSld>
+  <p:clrMapOvr>
+    <a:masterClrMapping/>
+  </p:clrMapOvr>
+</p:sld>
+</file>
+
+<file path=ppt/slides/slide3.xml><?xml version="1.0" encoding="utf-8"?>
+<p:sld xmlns:a="http://schemas.openxmlformats.org/drawingml/2006/main" xmlns:r="http://schemas.openxmlformats.org/officeDocument/2006/relationships" xmlns:p="http://schemas.openxmlformats.org/presentationml/2006/main">
+  <p:cSld>
+    <p:spTree>
+      <p:nvGrpSpPr>
+        <p:cNvPr id="1" name=""/>
+        <p:cNvGrpSpPr/>
+        <p:nvPr/>
+      </p:nvGrpSpPr>
+      <p:grpSpPr>
+        <a:xfrm>
+          <a:off x="0" y="0"/>
+          <a:ext cx="0" cy="0"/>
+          <a:chOff x="0" y="0"/>
+          <a:chExt cx="0" cy="0"/>
+        </a:xfrm>
+      </p:grpSpPr>
+      <p:sp>
+        <p:nvSpPr>
+          <p:cNvPr id="4" name="Arc 3"/>
+          <p:cNvSpPr/>
+          <p:nvPr/>
+        </p:nvSpPr>
+        <p:spPr>
+          <a:xfrm>
+            <a:off x="1206683" y="2492896"/>
+            <a:ext cx="1422118" cy="1368152"/>
+          </a:xfrm>
+          <a:prstGeom prst="arc">
+            <a:avLst/>
+          </a:prstGeom>
+          <a:ln>
+            <a:solidFill>
+              <a:srgbClr val="FFFF00"/>
+            </a:solidFill>
+          </a:ln>
+        </p:spPr>
+        <p:style>
+          <a:lnRef idx="2">
+            <a:schemeClr val="dk1"/>
+          </a:lnRef>
+          <a:fillRef idx="0">
+            <a:schemeClr val="dk1"/>
+          </a:fillRef>
+          <a:effectRef idx="1">
+            <a:schemeClr val="dk1"/>
+          </a:effectRef>
+          <a:fontRef idx="minor">
+            <a:schemeClr val="tx1"/>
+          </a:fontRef>
+        </p:style>
+        <p:txBody>
+          <a:bodyPr rtlCol="0" anchor="ctr"/>
+          <a:lstStyle/>
+          <a:p>
+            <a:pPr algn="ctr"/>
+            <a:endParaRPr lang="sv-SE"/>
+          </a:p>
+        </p:txBody>
+      </p:sp>
+      <p:sp>
+        <p:nvSpPr>
+          <p:cNvPr id="5" name="Arc 4"/>
+          <p:cNvSpPr/>
+          <p:nvPr/>
+        </p:nvSpPr>
+        <p:spPr>
+          <a:xfrm>
+            <a:off x="1043608" y="2564904"/>
+            <a:ext cx="1422118" cy="1512168"/>
+          </a:xfrm>
+          <a:prstGeom prst="arc">
+            <a:avLst/>
+          </a:prstGeom>
+          <a:ln/>
+        </p:spPr>
+        <p:style>
+          <a:lnRef idx="2">
+            <a:schemeClr val="dk1"/>
+          </a:lnRef>
+          <a:fillRef idx="0">
+            <a:schemeClr val="dk1"/>
+          </a:fillRef>
+          <a:effectRef idx="1">
+            <a:schemeClr val="dk1"/>
+          </a:effectRef>
+          <a:fontRef idx="minor">
+            <a:schemeClr val="tx1"/>
+          </a:fontRef>
+        </p:style>
+        <p:txBody>
+          <a:bodyPr rtlCol="0" anchor="ctr"/>
+          <a:lstStyle/>
+          <a:p>
+            <a:pPr algn="ctr"/>
+            <a:endParaRPr lang="sv-SE"/>
+          </a:p>
+        </p:txBody>
+      </p:sp>
+      <p:sp>
+        <p:nvSpPr>
+          <p:cNvPr id="6" name="Arc 5"/>
+          <p:cNvSpPr/>
+          <p:nvPr/>
+        </p:nvSpPr>
+        <p:spPr>
+          <a:xfrm>
+            <a:off x="1350699" y="2420888"/>
+            <a:ext cx="1422118" cy="1440160"/>
+          </a:xfrm>
+          <a:prstGeom prst="arc">
+            <a:avLst/>
+          </a:prstGeom>
+          <a:ln>
+            <a:solidFill>
+              <a:srgbClr val="FF0000"/>
+            </a:solidFill>
+          </a:ln>
+        </p:spPr>
+        <p:style>
+          <a:lnRef idx="2">
+            <a:schemeClr val="dk1"/>
+          </a:lnRef>
+          <a:fillRef idx="0">
+            <a:schemeClr val="dk1"/>
+          </a:fillRef>
+          <a:effectRef idx="1">
+            <a:schemeClr val="dk1"/>
+          </a:effectRef>
+          <a:fontRef idx="minor">
+            <a:schemeClr val="tx1"/>
+          </a:fontRef>
+        </p:style>
+        <p:txBody>
+          <a:bodyPr rtlCol="0" anchor="ctr"/>
+          <a:lstStyle/>
+          <a:p>
+            <a:pPr algn="ctr"/>
+            <a:endParaRPr lang="sv-SE"/>
+          </a:p>
+        </p:txBody>
+      </p:sp>
+      <p:sp>
+        <p:nvSpPr>
+          <p:cNvPr id="7" name="Rectangle 6"/>
+          <p:cNvSpPr/>
+          <p:nvPr/>
+        </p:nvSpPr>
+        <p:spPr>
+          <a:xfrm>
+            <a:off x="5220072" y="404664"/>
+            <a:ext cx="2520280" cy="6336704"/>
+          </a:xfrm>
+          <a:prstGeom prst="rect">
+            <a:avLst/>
+          </a:prstGeom>
+          <a:solidFill>
+            <a:schemeClr val="bg1">
+              <a:lumMod val="75000"/>
+            </a:schemeClr>
+          </a:solidFill>
+          <a:ln>
+            <a:solidFill>
+              <a:schemeClr val="tx1"/>
+            </a:solidFill>
+          </a:ln>
+        </p:spPr>
+        <p:style>
+          <a:lnRef idx="2">
+            <a:schemeClr val="accent1">
+              <a:shade val="50000"/>
+            </a:schemeClr>
+          </a:lnRef>
+          <a:fillRef idx="1">
+            <a:schemeClr val="accent1"/>
+          </a:fillRef>
+          <a:effectRef idx="0">
+            <a:schemeClr val="accent1"/>
+          </a:effectRef>
+          <a:fontRef idx="minor">
+            <a:schemeClr val="lt1"/>
+          </a:fontRef>
+        </p:style>
+        <p:txBody>
+          <a:bodyPr rtlCol="0" anchor="ctr"/>
+          <a:lstStyle/>
+          <a:p>
+            <a:pPr algn="ctr"/>
+            <a:endParaRPr lang="sv-SE"/>
+          </a:p>
+        </p:txBody>
+      </p:sp>
+      <p:sp>
+        <p:nvSpPr>
+          <p:cNvPr id="8" name="Rectangle 7"/>
+          <p:cNvSpPr/>
+          <p:nvPr/>
+        </p:nvSpPr>
+        <p:spPr>
+          <a:xfrm>
+            <a:off x="2167656" y="3135140"/>
+            <a:ext cx="792088" cy="2016224"/>
+          </a:xfrm>
+          <a:prstGeom prst="rect">
+            <a:avLst/>
+          </a:prstGeom>
+          <a:solidFill>
+            <a:schemeClr val="bg1">
+              <a:lumMod val="65000"/>
+            </a:schemeClr>
+          </a:solidFill>
+        </p:spPr>
+        <p:style>
+          <a:lnRef idx="2">
+            <a:schemeClr val="dk1">
+              <a:shade val="50000"/>
+            </a:schemeClr>
+          </a:lnRef>
+          <a:fillRef idx="1">
+            <a:schemeClr val="dk1"/>
+          </a:fillRef>
+          <a:effectRef idx="0">
+            <a:schemeClr val="dk1"/>
+          </a:effectRef>
+          <a:fontRef idx="minor">
+            <a:schemeClr val="lt1"/>
+          </a:fontRef>
+        </p:style>
+        <p:txBody>
+          <a:bodyPr rtlCol="0" anchor="ctr"/>
+          <a:lstStyle/>
+          <a:p>
+            <a:pPr algn="ctr"/>
+            <a:endParaRPr lang="sv-SE"/>
+          </a:p>
+        </p:txBody>
+      </p:sp>
+      <p:sp>
+        <p:nvSpPr>
+          <p:cNvPr id="9" name="Rectangle 8"/>
+          <p:cNvSpPr/>
+          <p:nvPr/>
+        </p:nvSpPr>
+        <p:spPr>
+          <a:xfrm rot="1417387">
+            <a:off x="2721012" y="3047881"/>
+            <a:ext cx="209990" cy="1368152"/>
+          </a:xfrm>
+          <a:prstGeom prst="rect">
+            <a:avLst/>
+          </a:prstGeom>
+        </p:spPr>
+        <p:style>
+          <a:lnRef idx="2">
+            <a:schemeClr val="dk1"/>
+          </a:lnRef>
+          <a:fillRef idx="1">
+            <a:schemeClr val="lt1"/>
+          </a:fillRef>
+          <a:effectRef idx="0">
+            <a:schemeClr val="dk1"/>
+          </a:effectRef>
+          <a:fontRef idx="minor">
+            <a:schemeClr val="dk1"/>
+          </a:fontRef>
+        </p:style>
+        <p:txBody>
+          <a:bodyPr rtlCol="0" anchor="ctr"/>
+          <a:lstStyle/>
+          <a:p>
+            <a:pPr algn="ctr"/>
+            <a:endParaRPr lang="sv-SE"/>
+          </a:p>
+        </p:txBody>
+      </p:sp>
+      <p:sp>
+        <p:nvSpPr>
+          <p:cNvPr id="10" name="Oval 9"/>
+          <p:cNvSpPr/>
+          <p:nvPr/>
+        </p:nvSpPr>
+        <p:spPr>
+          <a:xfrm>
+            <a:off x="2455688" y="4143252"/>
+            <a:ext cx="257530" cy="257530"/>
+          </a:xfrm>
+          <a:prstGeom prst="ellipse">
+            <a:avLst/>
+          </a:prstGeom>
+        </p:spPr>
+        <p:style>
+          <a:lnRef idx="2">
+            <a:schemeClr val="dk1"/>
+          </a:lnRef>
+          <a:fillRef idx="1">
+            <a:schemeClr val="lt1"/>
+          </a:fillRef>
+          <a:effectRef idx="0">
+            <a:schemeClr val="dk1"/>
+          </a:effectRef>
+          <a:fontRef idx="minor">
+            <a:schemeClr val="dk1"/>
+          </a:fontRef>
+        </p:style>
+        <p:txBody>
+          <a:bodyPr rtlCol="0" anchor="ctr"/>
+          <a:lstStyle/>
+          <a:p>
+            <a:pPr algn="ctr"/>
+            <a:endParaRPr lang="sv-SE"/>
+          </a:p>
+        </p:txBody>
+      </p:sp>
+      <p:cxnSp>
+        <p:nvCxnSpPr>
+          <p:cNvPr id="11" name="Straight Connector 10"/>
+          <p:cNvCxnSpPr>
+            <a:stCxn id="9" idx="0"/>
+            <a:endCxn id="32" idx="1"/>
+          </p:cNvCxnSpPr>
+          <p:nvPr/>
+        </p:nvCxnSpPr>
+        <p:spPr>
+          <a:xfrm>
+            <a:off x="3100129" y="3105206"/>
+            <a:ext cx="2067665" cy="1119178"/>
+          </a:xfrm>
+          <a:prstGeom prst="line">
+            <a:avLst/>
+          </a:prstGeom>
+        </p:spPr>
+        <p:style>
+          <a:lnRef idx="2">
+            <a:schemeClr val="dk1"/>
+          </a:lnRef>
+          <a:fillRef idx="0">
+            <a:schemeClr val="dk1"/>
+          </a:fillRef>
+          <a:effectRef idx="1">
+            <a:schemeClr val="dk1"/>
+          </a:effectRef>
+          <a:fontRef idx="minor">
+            <a:schemeClr val="tx1"/>
+          </a:fontRef>
+        </p:style>
+      </p:cxnSp>
+      <p:cxnSp>
+        <p:nvCxnSpPr>
+          <p:cNvPr id="12" name="Straight Connector 11"/>
+          <p:cNvCxnSpPr>
+            <a:stCxn id="10" idx="2"/>
+            <a:endCxn id="32" idx="2"/>
+          </p:cNvCxnSpPr>
+          <p:nvPr/>
+        </p:nvCxnSpPr>
+        <p:spPr>
+          <a:xfrm flipV="1">
+            <a:off x="2455688" y="4272016"/>
+            <a:ext cx="2692376" cy="1"/>
+          </a:xfrm>
+          <a:prstGeom prst="line">
+            <a:avLst/>
+          </a:prstGeom>
+          <a:ln>
+            <a:solidFill>
+              <a:schemeClr val="tx1"/>
+            </a:solidFill>
+            <a:prstDash val="lgDash"/>
+          </a:ln>
+        </p:spPr>
+        <p:style>
+          <a:lnRef idx="1">
+            <a:schemeClr val="accent1"/>
+          </a:lnRef>
+          <a:fillRef idx="0">
+            <a:schemeClr val="accent1"/>
+          </a:fillRef>
+          <a:effectRef idx="0">
+            <a:schemeClr val="accent1"/>
+          </a:effectRef>
+          <a:fontRef idx="minor">
+            <a:schemeClr val="tx1"/>
+          </a:fontRef>
+        </p:style>
+      </p:cxnSp>
+      <p:sp>
+        <p:nvSpPr>
+          <p:cNvPr id="13" name="Pie 12"/>
+          <p:cNvSpPr/>
+          <p:nvPr/>
+        </p:nvSpPr>
+        <p:spPr>
+          <a:xfrm rot="20099691">
+            <a:off x="2243701" y="3821966"/>
+            <a:ext cx="900100" cy="900100"/>
+          </a:xfrm>
+          <a:prstGeom prst="pie">
+            <a:avLst>
+              <a:gd name="adj1" fmla="val 19199900"/>
+              <a:gd name="adj2" fmla="val 1478485"/>
+            </a:avLst>
+          </a:prstGeom>
+        </p:spPr>
+        <p:style>
+          <a:lnRef idx="2">
+            <a:schemeClr val="dk1"/>
+          </a:lnRef>
+          <a:fillRef idx="1">
+            <a:schemeClr val="lt1"/>
+          </a:fillRef>
+          <a:effectRef idx="0">
+            <a:schemeClr val="dk1"/>
+          </a:effectRef>
+          <a:fontRef idx="minor">
+            <a:schemeClr val="dk1"/>
+          </a:fontRef>
+        </p:style>
+        <p:txBody>
+          <a:bodyPr rtlCol="0" anchor="ctr"/>
+          <a:lstStyle/>
+          <a:p>
+            <a:pPr algn="ctr"/>
+            <a:endParaRPr lang="sv-SE">
+              <a:solidFill>
+                <a:schemeClr val="tx1"/>
+              </a:solidFill>
+            </a:endParaRPr>
+          </a:p>
+        </p:txBody>
+      </p:sp>
+      <p:sp>
+        <p:nvSpPr>
+          <p:cNvPr id="14" name="TextBox 13"/>
+          <p:cNvSpPr txBox="1"/>
+          <p:nvPr/>
+        </p:nvSpPr>
+        <p:spPr>
+          <a:xfrm>
+            <a:off x="3103760" y="3783212"/>
+            <a:ext cx="316112" cy="369332"/>
+          </a:xfrm>
+          <a:prstGeom prst="rect">
+            <a:avLst/>
+          </a:prstGeom>
+          <a:noFill/>
+        </p:spPr>
+        <p:txBody>
+          <a:bodyPr wrap="none" rtlCol="0">
+            <a:spAutoFit/>
+          </a:bodyPr>
+          <a:lstStyle/>
+          <a:p>
+            <a:r>
+              <a:rPr lang="el-GR" dirty="0" smtClean="0"/>
+              <a:t>α</a:t>
+            </a:r>
+            <a:endParaRPr lang="sv-SE" dirty="0"/>
+          </a:p>
+        </p:txBody>
+      </p:sp>
+      <p:sp>
+        <p:nvSpPr>
+          <p:cNvPr id="15" name="TextBox 14"/>
+          <p:cNvSpPr txBox="1"/>
+          <p:nvPr/>
+        </p:nvSpPr>
+        <p:spPr>
+          <a:xfrm>
+            <a:off x="3309862" y="4287268"/>
+            <a:ext cx="1406154" cy="369332"/>
+          </a:xfrm>
+          <a:prstGeom prst="rect">
+            <a:avLst/>
+          </a:prstGeom>
+          <a:noFill/>
+        </p:spPr>
+        <p:txBody>
+          <a:bodyPr wrap="none" rtlCol="0">
+            <a:spAutoFit/>
+          </a:bodyPr>
+          <a:lstStyle/>
+          <a:p>
+            <a:r>
+              <a:rPr lang="sv-SE" dirty="0"/>
+              <a:t>c</a:t>
+            </a:r>
+            <a:r>
+              <a:rPr lang="sv-SE" dirty="0" smtClean="0"/>
+              <a:t> (x-position)</a:t>
+            </a:r>
+            <a:endParaRPr lang="sv-SE" dirty="0"/>
+          </a:p>
+        </p:txBody>
+      </p:sp>
+      <p:sp>
+        <p:nvSpPr>
+          <p:cNvPr id="16" name="TextBox 15"/>
+          <p:cNvSpPr txBox="1"/>
+          <p:nvPr/>
+        </p:nvSpPr>
+        <p:spPr>
+          <a:xfrm>
+            <a:off x="4725816" y="3135140"/>
+            <a:ext cx="295274" cy="369332"/>
+          </a:xfrm>
+          <a:prstGeom prst="rect">
+            <a:avLst/>
+          </a:prstGeom>
+          <a:noFill/>
+        </p:spPr>
+        <p:txBody>
+          <a:bodyPr wrap="none" rtlCol="0">
+            <a:spAutoFit/>
+          </a:bodyPr>
+          <a:lstStyle/>
+          <a:p>
+            <a:r>
+              <a:rPr lang="sv-SE" dirty="0" smtClean="0"/>
+              <a:t>a</a:t>
+            </a:r>
+            <a:endParaRPr lang="sv-SE" dirty="0"/>
+          </a:p>
+        </p:txBody>
+      </p:sp>
+      <p:sp>
+        <p:nvSpPr>
+          <p:cNvPr id="17" name="TextBox 16"/>
+          <p:cNvSpPr txBox="1"/>
+          <p:nvPr/>
+        </p:nvSpPr>
+        <p:spPr>
+          <a:xfrm>
+            <a:off x="2443228" y="3319279"/>
+            <a:ext cx="306494" cy="369332"/>
+          </a:xfrm>
+          <a:prstGeom prst="rect">
+            <a:avLst/>
+          </a:prstGeom>
+          <a:noFill/>
+        </p:spPr>
+        <p:txBody>
+          <a:bodyPr wrap="none" rtlCol="0">
+            <a:spAutoFit/>
+          </a:bodyPr>
+          <a:lstStyle/>
+          <a:p>
+            <a:r>
+              <a:rPr lang="sv-SE" dirty="0"/>
+              <a:t>b</a:t>
+            </a:r>
+          </a:p>
+        </p:txBody>
+      </p:sp>
+      <p:sp>
+        <p:nvSpPr>
+          <p:cNvPr id="18" name="TextBox 17"/>
+          <p:cNvSpPr txBox="1"/>
+          <p:nvPr/>
+        </p:nvSpPr>
+        <p:spPr>
+          <a:xfrm>
+            <a:off x="2236441" y="5147900"/>
+            <a:ext cx="816249" cy="369332"/>
+          </a:xfrm>
+          <a:prstGeom prst="rect">
+            <a:avLst/>
+          </a:prstGeom>
+          <a:noFill/>
+        </p:spPr>
+        <p:txBody>
+          <a:bodyPr wrap="none" rtlCol="0">
+            <a:spAutoFit/>
+          </a:bodyPr>
+          <a:lstStyle/>
+          <a:p>
+            <a:r>
+              <a:rPr lang="sv-SE" dirty="0" smtClean="0"/>
+              <a:t>servoX</a:t>
+            </a:r>
+            <a:endParaRPr lang="sv-SE" dirty="0"/>
+          </a:p>
+        </p:txBody>
+      </p:sp>
+      <p:sp>
+        <p:nvSpPr>
+          <p:cNvPr id="19" name="TextBox 18"/>
+          <p:cNvSpPr txBox="1"/>
+          <p:nvPr/>
+        </p:nvSpPr>
+        <p:spPr>
+          <a:xfrm>
+            <a:off x="2267744" y="5589240"/>
+            <a:ext cx="2600071" cy="923330"/>
+          </a:xfrm>
+          <a:prstGeom prst="rect">
+            <a:avLst/>
+          </a:prstGeom>
+          <a:noFill/>
+        </p:spPr>
+        <p:txBody>
+          <a:bodyPr wrap="none" rtlCol="0">
+            <a:spAutoFit/>
+          </a:bodyPr>
+          <a:lstStyle/>
+          <a:p>
+            <a:r>
+              <a:rPr lang="sv-SE" dirty="0" smtClean="0"/>
+              <a:t>a</a:t>
+            </a:r>
+            <a:r>
+              <a:rPr lang="el-GR" dirty="0" smtClean="0"/>
+              <a:t>²</a:t>
+            </a:r>
+            <a:r>
+              <a:rPr lang="sv-SE" dirty="0" smtClean="0"/>
+              <a:t> = b</a:t>
+            </a:r>
+            <a:r>
+              <a:rPr lang="el-GR" dirty="0" smtClean="0"/>
+              <a:t>²</a:t>
+            </a:r>
+            <a:r>
+              <a:rPr lang="sv-SE" dirty="0" smtClean="0"/>
+              <a:t> + c</a:t>
+            </a:r>
+            <a:r>
+              <a:rPr lang="el-GR" dirty="0" smtClean="0"/>
+              <a:t>²</a:t>
+            </a:r>
+            <a:r>
+              <a:rPr lang="sv-SE" dirty="0" smtClean="0"/>
+              <a:t> - 2bc cos(</a:t>
+            </a:r>
+            <a:r>
+              <a:rPr lang="el-GR" dirty="0" smtClean="0"/>
+              <a:t>α</a:t>
+            </a:r>
+            <a:r>
+              <a:rPr lang="sv-SE" dirty="0" smtClean="0"/>
+              <a:t>)</a:t>
+            </a:r>
+          </a:p>
+          <a:p>
+            <a:r>
+              <a:rPr lang="sv-SE" dirty="0" smtClean="0"/>
+              <a:t>=&gt;</a:t>
+            </a:r>
+          </a:p>
+          <a:p>
+            <a:r>
+              <a:rPr lang="sv-SE" dirty="0" smtClean="0"/>
+              <a:t>cos(</a:t>
+            </a:r>
+            <a:r>
+              <a:rPr lang="el-GR" dirty="0" smtClean="0"/>
+              <a:t>α</a:t>
+            </a:r>
+            <a:r>
+              <a:rPr lang="sv-SE" dirty="0" smtClean="0"/>
+              <a:t>) = (c</a:t>
+            </a:r>
+            <a:r>
+              <a:rPr lang="el-GR" dirty="0" smtClean="0"/>
+              <a:t>²</a:t>
+            </a:r>
+            <a:r>
+              <a:rPr lang="sv-SE" dirty="0" smtClean="0"/>
+              <a:t> + b</a:t>
+            </a:r>
+            <a:r>
+              <a:rPr lang="el-GR" dirty="0" smtClean="0"/>
+              <a:t>²</a:t>
+            </a:r>
+            <a:r>
+              <a:rPr lang="sv-SE" dirty="0" smtClean="0"/>
+              <a:t> -a</a:t>
+            </a:r>
+            <a:r>
+              <a:rPr lang="el-GR" dirty="0" smtClean="0"/>
+              <a:t>²</a:t>
+            </a:r>
+            <a:r>
+              <a:rPr lang="sv-SE" dirty="0" smtClean="0"/>
+              <a:t>)/(2bc)</a:t>
+            </a:r>
+            <a:endParaRPr lang="sv-SE" dirty="0"/>
+          </a:p>
+        </p:txBody>
+      </p:sp>
+      <p:sp>
+        <p:nvSpPr>
+          <p:cNvPr id="20" name="TextBox 19"/>
+          <p:cNvSpPr txBox="1"/>
+          <p:nvPr/>
+        </p:nvSpPr>
+        <p:spPr>
+          <a:xfrm>
+            <a:off x="1613484" y="902892"/>
+            <a:ext cx="3126433" cy="369332"/>
+          </a:xfrm>
+          <a:prstGeom prst="rect">
+            <a:avLst/>
+          </a:prstGeom>
+          <a:noFill/>
+        </p:spPr>
+        <p:txBody>
+          <a:bodyPr wrap="none" rtlCol="0">
+            <a:spAutoFit/>
+          </a:bodyPr>
+          <a:lstStyle/>
+          <a:p>
+            <a:r>
+              <a:rPr lang="sv-SE" dirty="0" smtClean="0"/>
+              <a:t>Servo controls angle with PWM</a:t>
+            </a:r>
+            <a:endParaRPr lang="sv-SE" dirty="0"/>
+          </a:p>
+        </p:txBody>
+      </p:sp>
+      <p:sp>
+        <p:nvSpPr>
+          <p:cNvPr id="21" name="Arc 20"/>
+          <p:cNvSpPr/>
+          <p:nvPr/>
+        </p:nvSpPr>
+        <p:spPr>
+          <a:xfrm rot="5400000">
+            <a:off x="6767388" y="-525535"/>
+            <a:ext cx="1422118" cy="1368152"/>
+          </a:xfrm>
+          <a:prstGeom prst="arc">
+            <a:avLst/>
+          </a:prstGeom>
+          <a:ln>
+            <a:solidFill>
+              <a:srgbClr val="FFFF00"/>
+            </a:solidFill>
+          </a:ln>
+        </p:spPr>
+        <p:style>
+          <a:lnRef idx="2">
+            <a:schemeClr val="dk1"/>
+          </a:lnRef>
+          <a:fillRef idx="0">
+            <a:schemeClr val="dk1"/>
+          </a:fillRef>
+          <a:effectRef idx="1">
+            <a:schemeClr val="dk1"/>
+          </a:effectRef>
+          <a:fontRef idx="minor">
+            <a:schemeClr val="tx1"/>
+          </a:fontRef>
+        </p:style>
+        <p:txBody>
+          <a:bodyPr rtlCol="0" anchor="ctr"/>
+          <a:lstStyle/>
+          <a:p>
+            <a:pPr algn="ctr"/>
+            <a:endParaRPr lang="sv-SE"/>
+          </a:p>
+        </p:txBody>
+      </p:sp>
+      <p:sp>
+        <p:nvSpPr>
+          <p:cNvPr id="22" name="Rectangle 21"/>
+          <p:cNvSpPr/>
+          <p:nvPr/>
+        </p:nvSpPr>
+        <p:spPr>
+          <a:xfrm rot="5400000">
+            <a:off x="6110296" y="-12458"/>
+            <a:ext cx="792088" cy="2016224"/>
+          </a:xfrm>
+          <a:prstGeom prst="rect">
+            <a:avLst/>
+          </a:prstGeom>
+          <a:solidFill>
+            <a:schemeClr val="bg1">
+              <a:lumMod val="65000"/>
+            </a:schemeClr>
+          </a:solidFill>
+        </p:spPr>
+        <p:style>
+          <a:lnRef idx="2">
+            <a:schemeClr val="dk1">
+              <a:shade val="50000"/>
+            </a:schemeClr>
+          </a:lnRef>
+          <a:fillRef idx="1">
+            <a:schemeClr val="dk1"/>
+          </a:fillRef>
+          <a:effectRef idx="0">
+            <a:schemeClr val="dk1"/>
+          </a:effectRef>
+          <a:fontRef idx="minor">
+            <a:schemeClr val="lt1"/>
+          </a:fontRef>
+        </p:style>
+        <p:txBody>
+          <a:bodyPr rtlCol="0" anchor="ctr"/>
+          <a:lstStyle/>
+          <a:p>
+            <a:pPr algn="ctr"/>
+            <a:endParaRPr lang="sv-SE"/>
+          </a:p>
+        </p:txBody>
+      </p:sp>
+      <p:sp>
+        <p:nvSpPr>
+          <p:cNvPr id="23" name="Rectangle 22"/>
+          <p:cNvSpPr/>
+          <p:nvPr/>
+        </p:nvSpPr>
+        <p:spPr>
+          <a:xfrm rot="6817387">
+            <a:off x="6812640" y="573886"/>
+            <a:ext cx="209990" cy="1368152"/>
+          </a:xfrm>
+          <a:prstGeom prst="rect">
+            <a:avLst/>
+          </a:prstGeom>
+        </p:spPr>
+        <p:style>
+          <a:lnRef idx="2">
+            <a:schemeClr val="dk1"/>
+          </a:lnRef>
+          <a:fillRef idx="1">
+            <a:schemeClr val="lt1"/>
+          </a:fillRef>
+          <a:effectRef idx="0">
+            <a:schemeClr val="dk1"/>
+          </a:effectRef>
+          <a:fontRef idx="minor">
+            <a:schemeClr val="dk1"/>
+          </a:fontRef>
+        </p:style>
+        <p:txBody>
+          <a:bodyPr rtlCol="0" anchor="ctr"/>
+          <a:lstStyle/>
+          <a:p>
+            <a:pPr algn="ctr"/>
+            <a:endParaRPr lang="sv-SE"/>
+          </a:p>
+        </p:txBody>
+      </p:sp>
+      <p:sp>
+        <p:nvSpPr>
+          <p:cNvPr id="24" name="Oval 23"/>
+          <p:cNvSpPr/>
+          <p:nvPr/>
+        </p:nvSpPr>
+        <p:spPr>
+          <a:xfrm rot="5400000">
+            <a:off x="6248810" y="887643"/>
+            <a:ext cx="257530" cy="257530"/>
+          </a:xfrm>
+          <a:prstGeom prst="ellipse">
+            <a:avLst/>
+          </a:prstGeom>
+        </p:spPr>
+        <p:style>
+          <a:lnRef idx="2">
+            <a:schemeClr val="dk1"/>
+          </a:lnRef>
+          <a:fillRef idx="1">
+            <a:schemeClr val="lt1"/>
+          </a:fillRef>
+          <a:effectRef idx="0">
+            <a:schemeClr val="dk1"/>
+          </a:effectRef>
+          <a:fontRef idx="minor">
+            <a:schemeClr val="dk1"/>
+          </a:fontRef>
+        </p:style>
+        <p:txBody>
+          <a:bodyPr rtlCol="0" anchor="ctr"/>
+          <a:lstStyle/>
+          <a:p>
+            <a:pPr algn="ctr"/>
+            <a:endParaRPr lang="sv-SE"/>
+          </a:p>
+        </p:txBody>
+      </p:sp>
+      <p:cxnSp>
+        <p:nvCxnSpPr>
+          <p:cNvPr id="25" name="Straight Connector 24"/>
+          <p:cNvCxnSpPr>
+            <a:stCxn id="23" idx="0"/>
+          </p:cNvCxnSpPr>
+          <p:nvPr/>
+        </p:nvCxnSpPr>
+        <p:spPr>
+          <a:xfrm flipH="1">
+            <a:off x="6376738" y="1532084"/>
+            <a:ext cx="1167648" cy="1312110"/>
+          </a:xfrm>
+          <a:prstGeom prst="line">
+            <a:avLst/>
+          </a:prstGeom>
+        </p:spPr>
+        <p:style>
+          <a:lnRef idx="2">
+            <a:schemeClr val="dk1"/>
+          </a:lnRef>
+          <a:fillRef idx="0">
+            <a:schemeClr val="dk1"/>
+          </a:fillRef>
+          <a:effectRef idx="1">
+            <a:schemeClr val="dk1"/>
+          </a:effectRef>
+          <a:fontRef idx="minor">
+            <a:schemeClr val="tx1"/>
+          </a:fontRef>
+        </p:style>
+      </p:cxnSp>
+      <p:sp>
+        <p:nvSpPr>
+          <p:cNvPr id="26" name="Arc 25"/>
+          <p:cNvSpPr/>
+          <p:nvPr/>
+        </p:nvSpPr>
+        <p:spPr>
+          <a:xfrm rot="5400000">
+            <a:off x="6839396" y="-228482"/>
+            <a:ext cx="1422118" cy="1512168"/>
+          </a:xfrm>
+          <a:prstGeom prst="arc">
+            <a:avLst/>
+          </a:prstGeom>
+          <a:ln/>
+        </p:spPr>
+        <p:style>
+          <a:lnRef idx="2">
+            <a:schemeClr val="dk1"/>
+          </a:lnRef>
+          <a:fillRef idx="0">
+            <a:schemeClr val="dk1"/>
+          </a:fillRef>
+          <a:effectRef idx="1">
+            <a:schemeClr val="dk1"/>
+          </a:effectRef>
+          <a:fontRef idx="minor">
+            <a:schemeClr val="tx1"/>
+          </a:fontRef>
+        </p:style>
+        <p:txBody>
+          <a:bodyPr rtlCol="0" anchor="ctr"/>
+          <a:lstStyle/>
+          <a:p>
+            <a:pPr algn="ctr"/>
+            <a:endParaRPr lang="sv-SE"/>
+          </a:p>
+        </p:txBody>
+      </p:sp>
+      <p:sp>
+        <p:nvSpPr>
+          <p:cNvPr id="27" name="Arc 26"/>
+          <p:cNvSpPr/>
+          <p:nvPr/>
+        </p:nvSpPr>
+        <p:spPr>
+          <a:xfrm rot="5400000">
+            <a:off x="6803392" y="-417523"/>
+            <a:ext cx="1422118" cy="1440160"/>
+          </a:xfrm>
+          <a:prstGeom prst="arc">
+            <a:avLst/>
+          </a:prstGeom>
+          <a:ln>
+            <a:solidFill>
+              <a:srgbClr val="FF0000"/>
+            </a:solidFill>
+          </a:ln>
+        </p:spPr>
+        <p:style>
+          <a:lnRef idx="2">
+            <a:schemeClr val="dk1"/>
+          </a:lnRef>
+          <a:fillRef idx="0">
+            <a:schemeClr val="dk1"/>
+          </a:fillRef>
+          <a:effectRef idx="1">
+            <a:schemeClr val="dk1"/>
+          </a:effectRef>
+          <a:fontRef idx="minor">
+            <a:schemeClr val="tx1"/>
+          </a:fontRef>
+        </p:style>
+        <p:txBody>
+          <a:bodyPr rtlCol="0" anchor="ctr"/>
+          <a:lstStyle/>
+          <a:p>
+            <a:pPr algn="ctr"/>
+            <a:endParaRPr lang="sv-SE"/>
+          </a:p>
+        </p:txBody>
+      </p:sp>
+      <p:sp>
+        <p:nvSpPr>
+          <p:cNvPr id="28" name="TextBox 27"/>
+          <p:cNvSpPr txBox="1"/>
+          <p:nvPr/>
+        </p:nvSpPr>
+        <p:spPr>
+          <a:xfrm>
+            <a:off x="5432561" y="1411968"/>
+            <a:ext cx="808235" cy="369332"/>
+          </a:xfrm>
+          <a:prstGeom prst="rect">
+            <a:avLst/>
+          </a:prstGeom>
+          <a:noFill/>
+        </p:spPr>
+        <p:txBody>
+          <a:bodyPr wrap="none" rtlCol="0">
+            <a:spAutoFit/>
+          </a:bodyPr>
+          <a:lstStyle/>
+          <a:p>
+            <a:r>
+              <a:rPr lang="sv-SE" dirty="0" smtClean="0"/>
+              <a:t>servoY</a:t>
+            </a:r>
+            <a:endParaRPr lang="sv-SE" dirty="0"/>
+          </a:p>
+        </p:txBody>
+      </p:sp>
+      <p:sp>
+        <p:nvSpPr>
+          <p:cNvPr id="29" name="Rectangle 28"/>
+          <p:cNvSpPr/>
+          <p:nvPr/>
+        </p:nvSpPr>
+        <p:spPr>
+          <a:xfrm>
+            <a:off x="5436096" y="2844194"/>
+            <a:ext cx="2117894" cy="1878036"/>
+          </a:xfrm>
+          <a:prstGeom prst="rect">
+            <a:avLst/>
+          </a:prstGeom>
+          <a:solidFill>
+            <a:schemeClr val="bg1">
+              <a:lumMod val="65000"/>
+            </a:schemeClr>
+          </a:solidFill>
+          <a:ln>
+            <a:solidFill>
+              <a:schemeClr val="tx1"/>
+            </a:solidFill>
+          </a:ln>
+        </p:spPr>
+        <p:style>
+          <a:lnRef idx="2">
+            <a:schemeClr val="accent1">
+              <a:shade val="50000"/>
+            </a:schemeClr>
+          </a:lnRef>
+          <a:fillRef idx="1">
+            <a:schemeClr val="accent1"/>
+          </a:fillRef>
+          <a:effectRef idx="0">
+            <a:schemeClr val="accent1"/>
+          </a:effectRef>
+          <a:fontRef idx="minor">
+            <a:schemeClr val="lt1"/>
+          </a:fontRef>
+        </p:style>
+        <p:txBody>
+          <a:bodyPr rtlCol="0" anchor="ctr"/>
+          <a:lstStyle/>
+          <a:p>
+            <a:pPr algn="ctr"/>
+            <a:endParaRPr lang="sv-SE"/>
+          </a:p>
+        </p:txBody>
+      </p:sp>
+      <p:cxnSp>
+        <p:nvCxnSpPr>
+          <p:cNvPr id="30" name="Straight Connector 29"/>
+          <p:cNvCxnSpPr/>
+          <p:nvPr/>
+        </p:nvCxnSpPr>
+        <p:spPr>
+          <a:xfrm flipH="1" flipV="1">
+            <a:off x="6376738" y="1033903"/>
+            <a:ext cx="837" cy="1810291"/>
+          </a:xfrm>
+          <a:prstGeom prst="line">
+            <a:avLst/>
+          </a:prstGeom>
+          <a:ln>
+            <a:solidFill>
+              <a:schemeClr val="tx1"/>
+            </a:solidFill>
+            <a:prstDash val="lgDash"/>
+          </a:ln>
+        </p:spPr>
+        <p:style>
+          <a:lnRef idx="1">
+            <a:schemeClr val="accent1"/>
+          </a:lnRef>
+          <a:fillRef idx="0">
+            <a:schemeClr val="accent1"/>
+          </a:fillRef>
+          <a:effectRef idx="0">
+            <a:schemeClr val="accent1"/>
+          </a:effectRef>
+          <a:fontRef idx="minor">
+            <a:schemeClr val="tx1"/>
+          </a:fontRef>
+        </p:style>
+      </p:cxnSp>
+      <p:sp>
+        <p:nvSpPr>
+          <p:cNvPr id="31" name="Oval 30"/>
+          <p:cNvSpPr/>
+          <p:nvPr/>
+        </p:nvSpPr>
+        <p:spPr>
+          <a:xfrm>
+            <a:off x="6310213" y="2780928"/>
+            <a:ext cx="134724" cy="134724"/>
+          </a:xfrm>
+          <a:prstGeom prst="ellipse">
+            <a:avLst/>
+          </a:prstGeom>
+        </p:spPr>
+        <p:style>
+          <a:lnRef idx="2">
+            <a:schemeClr val="dk1">
+              <a:shade val="50000"/>
+            </a:schemeClr>
+          </a:lnRef>
+          <a:fillRef idx="1">
+            <a:schemeClr val="dk1"/>
+          </a:fillRef>
+          <a:effectRef idx="0">
+            <a:schemeClr val="dk1"/>
+          </a:effectRef>
+          <a:fontRef idx="minor">
+            <a:schemeClr val="lt1"/>
+          </a:fontRef>
+        </p:style>
+        <p:txBody>
+          <a:bodyPr rtlCol="0" anchor="ctr"/>
+          <a:lstStyle/>
+          <a:p>
+            <a:pPr algn="ctr"/>
+            <a:endParaRPr lang="sv-SE"/>
+          </a:p>
+        </p:txBody>
+      </p:sp>
+      <p:sp>
+        <p:nvSpPr>
+          <p:cNvPr id="32" name="Oval 31"/>
+          <p:cNvSpPr/>
+          <p:nvPr/>
+        </p:nvSpPr>
+        <p:spPr>
+          <a:xfrm>
+            <a:off x="5148064" y="4204654"/>
+            <a:ext cx="134724" cy="134724"/>
+          </a:xfrm>
+          <a:prstGeom prst="ellipse">
+            <a:avLst/>
+          </a:prstGeom>
+        </p:spPr>
+        <p:style>
+          <a:lnRef idx="2">
+            <a:schemeClr val="dk1">
+              <a:shade val="50000"/>
+            </a:schemeClr>
+          </a:lnRef>
+          <a:fillRef idx="1">
+            <a:schemeClr val="dk1"/>
+          </a:fillRef>
+          <a:effectRef idx="0">
+            <a:schemeClr val="dk1"/>
+          </a:effectRef>
+          <a:fontRef idx="minor">
+            <a:schemeClr val="lt1"/>
+          </a:fontRef>
+        </p:style>
+        <p:txBody>
+          <a:bodyPr rtlCol="0" anchor="ctr"/>
+          <a:lstStyle/>
+          <a:p>
+            <a:pPr algn="ctr"/>
+            <a:endParaRPr lang="sv-SE"/>
+          </a:p>
+        </p:txBody>
+      </p:sp>
+    </p:spTree>
+    <p:extLst>
+      <p:ext uri="{BB962C8B-B14F-4D97-AF65-F5344CB8AC3E}">
+        <p14:creationId xmlns:p14="http://schemas.microsoft.com/office/powerpoint/2010/main" val="2036801382"/>
       </p:ext>
     </p:extLst>
   </p:cSld>

</xml_diff>

<commit_message>
adding support for G52 and G92
</commit_message>
<xml_diff>
--- a/nano_mill/description.pptx
+++ b/nano_mill/description.pptx
@@ -290,7 +290,7 @@
           <a:p>
             <a:fld id="{ADA040D9-D6B8-435D-A8A0-5862BA4C7EDE}" type="datetimeFigureOut">
               <a:rPr lang="sv-SE" smtClean="0"/>
-              <a:t>2019-01-03</a:t>
+              <a:t>2019-01-23</a:t>
             </a:fld>
             <a:endParaRPr lang="sv-SE"/>
           </a:p>
@@ -460,7 +460,7 @@
           <a:p>
             <a:fld id="{ADA040D9-D6B8-435D-A8A0-5862BA4C7EDE}" type="datetimeFigureOut">
               <a:rPr lang="sv-SE" smtClean="0"/>
-              <a:t>2019-01-03</a:t>
+              <a:t>2019-01-23</a:t>
             </a:fld>
             <a:endParaRPr lang="sv-SE"/>
           </a:p>
@@ -640,7 +640,7 @@
           <a:p>
             <a:fld id="{ADA040D9-D6B8-435D-A8A0-5862BA4C7EDE}" type="datetimeFigureOut">
               <a:rPr lang="sv-SE" smtClean="0"/>
-              <a:t>2019-01-03</a:t>
+              <a:t>2019-01-23</a:t>
             </a:fld>
             <a:endParaRPr lang="sv-SE"/>
           </a:p>
@@ -810,7 +810,7 @@
           <a:p>
             <a:fld id="{ADA040D9-D6B8-435D-A8A0-5862BA4C7EDE}" type="datetimeFigureOut">
               <a:rPr lang="sv-SE" smtClean="0"/>
-              <a:t>2019-01-03</a:t>
+              <a:t>2019-01-23</a:t>
             </a:fld>
             <a:endParaRPr lang="sv-SE"/>
           </a:p>
@@ -1056,7 +1056,7 @@
           <a:p>
             <a:fld id="{ADA040D9-D6B8-435D-A8A0-5862BA4C7EDE}" type="datetimeFigureOut">
               <a:rPr lang="sv-SE" smtClean="0"/>
-              <a:t>2019-01-03</a:t>
+              <a:t>2019-01-23</a:t>
             </a:fld>
             <a:endParaRPr lang="sv-SE"/>
           </a:p>
@@ -1344,7 +1344,7 @@
           <a:p>
             <a:fld id="{ADA040D9-D6B8-435D-A8A0-5862BA4C7EDE}" type="datetimeFigureOut">
               <a:rPr lang="sv-SE" smtClean="0"/>
-              <a:t>2019-01-03</a:t>
+              <a:t>2019-01-23</a:t>
             </a:fld>
             <a:endParaRPr lang="sv-SE"/>
           </a:p>
@@ -1766,7 +1766,7 @@
           <a:p>
             <a:fld id="{ADA040D9-D6B8-435D-A8A0-5862BA4C7EDE}" type="datetimeFigureOut">
               <a:rPr lang="sv-SE" smtClean="0"/>
-              <a:t>2019-01-03</a:t>
+              <a:t>2019-01-23</a:t>
             </a:fld>
             <a:endParaRPr lang="sv-SE"/>
           </a:p>
@@ -1884,7 +1884,7 @@
           <a:p>
             <a:fld id="{ADA040D9-D6B8-435D-A8A0-5862BA4C7EDE}" type="datetimeFigureOut">
               <a:rPr lang="sv-SE" smtClean="0"/>
-              <a:t>2019-01-03</a:t>
+              <a:t>2019-01-23</a:t>
             </a:fld>
             <a:endParaRPr lang="sv-SE"/>
           </a:p>
@@ -1979,7 +1979,7 @@
           <a:p>
             <a:fld id="{ADA040D9-D6B8-435D-A8A0-5862BA4C7EDE}" type="datetimeFigureOut">
               <a:rPr lang="sv-SE" smtClean="0"/>
-              <a:t>2019-01-03</a:t>
+              <a:t>2019-01-23</a:t>
             </a:fld>
             <a:endParaRPr lang="sv-SE"/>
           </a:p>
@@ -2256,7 +2256,7 @@
           <a:p>
             <a:fld id="{ADA040D9-D6B8-435D-A8A0-5862BA4C7EDE}" type="datetimeFigureOut">
               <a:rPr lang="sv-SE" smtClean="0"/>
-              <a:t>2019-01-03</a:t>
+              <a:t>2019-01-23</a:t>
             </a:fld>
             <a:endParaRPr lang="sv-SE"/>
           </a:p>
@@ -2509,7 +2509,7 @@
           <a:p>
             <a:fld id="{ADA040D9-D6B8-435D-A8A0-5862BA4C7EDE}" type="datetimeFigureOut">
               <a:rPr lang="sv-SE" smtClean="0"/>
-              <a:t>2019-01-03</a:t>
+              <a:t>2019-01-23</a:t>
             </a:fld>
             <a:endParaRPr lang="sv-SE"/>
           </a:p>
@@ -2722,7 +2722,7 @@
           <a:p>
             <a:fld id="{ADA040D9-D6B8-435D-A8A0-5862BA4C7EDE}" type="datetimeFigureOut">
               <a:rPr lang="sv-SE" smtClean="0"/>
-              <a:t>2019-01-03</a:t>
+              <a:t>2019-01-23</a:t>
             </a:fld>
             <a:endParaRPr lang="sv-SE"/>
           </a:p>
@@ -3524,14 +3524,14 @@
           <p:nvPr>
             <p:extLst>
               <p:ext uri="{D42A27DB-BD31-4B8C-83A1-F6EECF244321}">
-                <p14:modId xmlns:p14="http://schemas.microsoft.com/office/powerpoint/2010/main" val="1173706368"/>
+                <p14:modId xmlns:p14="http://schemas.microsoft.com/office/powerpoint/2010/main" val="563253750"/>
               </p:ext>
             </p:extLst>
           </p:nvPr>
         </p:nvGraphicFramePr>
         <p:xfrm>
           <a:off x="611561" y="4005064"/>
-          <a:ext cx="3168351" cy="1368152"/>
+          <a:ext cx="3168351" cy="1669960"/>
         </p:xfrm>
         <a:graphic>
           <a:graphicData uri="http://schemas.openxmlformats.org/drawingml/2006/table">
@@ -3722,7 +3722,49 @@
                         <a:rPr lang="sv-SE" sz="1200" dirty="0" smtClean="0"/>
                         <a:t>16.7</a:t>
                       </a:r>
+                    </a:p>
+                  </a:txBody>
+                  <a:tcPr/>
+                </a:tc>
+              </a:tr>
+              <a:tr h="301808">
+                <a:tc>
+                  <a:txBody>
+                    <a:bodyPr/>
+                    <a:lstStyle/>
+                    <a:p>
+                      <a:r>
+                        <a:rPr lang="sv-SE" sz="1200" dirty="0" smtClean="0"/>
+                        <a:t>60</a:t>
+                      </a:r>
                       <a:endParaRPr lang="sv-SE" sz="1200" dirty="0"/>
+                    </a:p>
+                  </a:txBody>
+                  <a:tcPr/>
+                </a:tc>
+                <a:tc>
+                  <a:txBody>
+                    <a:bodyPr/>
+                    <a:lstStyle/>
+                    <a:p>
+                      <a:r>
+                        <a:rPr lang="sv-SE" sz="1200" dirty="0" smtClean="0"/>
+                        <a:t>0.1</a:t>
+                      </a:r>
+                      <a:endParaRPr lang="sv-SE" sz="1200" dirty="0"/>
+                    </a:p>
+                  </a:txBody>
+                  <a:tcPr/>
+                </a:tc>
+                <a:tc>
+                  <a:txBody>
+                    <a:bodyPr/>
+                    <a:lstStyle/>
+                    <a:p>
+                      <a:r>
+                        <a:rPr lang="sv-SE" sz="1200" dirty="0" smtClean="0"/>
+                        <a:t>10</a:t>
+                      </a:r>
                     </a:p>
                   </a:txBody>
                   <a:tcPr/>

</xml_diff>